<commit_message>
Added Communit First logo and thank you slide
</commit_message>
<xml_diff>
--- a/Akka_Sample/JaxDug_Presentation_Akka_Overview.pptx
+++ b/Akka_Sample/JaxDug_Presentation_Akka_Overview.pptx
@@ -19,6 +19,7 @@
     <p:sldId id="269" r:id="rId13"/>
     <p:sldId id="270" r:id="rId14"/>
     <p:sldId id="271" r:id="rId15"/>
+    <p:sldId id="272" r:id="rId16"/>
   </p:sldIdLst>
   <p:sldSz cx="12192000" cy="6858000"/>
   <p:notesSz cx="6858000" cy="9144000"/>
@@ -10492,7 +10493,7 @@
           <a:p>
             <a:fld id="{FE8BC13A-84C2-4F23-B046-9F1FD285F1D3}" type="datetimeFigureOut">
               <a:rPr lang="en-US" smtClean="0"/>
-              <a:t>6/4/2017</a:t>
+              <a:t>6/5/2017</a:t>
             </a:fld>
             <a:endParaRPr lang="en-US"/>
           </a:p>
@@ -10765,7 +10766,7 @@
           <a:p>
             <a:fld id="{FE8BC13A-84C2-4F23-B046-9F1FD285F1D3}" type="datetimeFigureOut">
               <a:rPr lang="en-US" smtClean="0"/>
-              <a:t>6/4/2017</a:t>
+              <a:t>6/5/2017</a:t>
             </a:fld>
             <a:endParaRPr lang="en-US"/>
           </a:p>
@@ -11022,7 +11023,7 @@
           <a:p>
             <a:fld id="{FE8BC13A-84C2-4F23-B046-9F1FD285F1D3}" type="datetimeFigureOut">
               <a:rPr lang="en-US" smtClean="0"/>
-              <a:t>6/4/2017</a:t>
+              <a:t>6/5/2017</a:t>
             </a:fld>
             <a:endParaRPr lang="en-US"/>
           </a:p>
@@ -11369,7 +11370,7 @@
           <a:p>
             <a:fld id="{FE8BC13A-84C2-4F23-B046-9F1FD285F1D3}" type="datetimeFigureOut">
               <a:rPr lang="en-US" smtClean="0"/>
-              <a:t>6/4/2017</a:t>
+              <a:t>6/5/2017</a:t>
             </a:fld>
             <a:endParaRPr lang="en-US"/>
           </a:p>
@@ -11771,7 +11772,7 @@
           <a:p>
             <a:fld id="{FE8BC13A-84C2-4F23-B046-9F1FD285F1D3}" type="datetimeFigureOut">
               <a:rPr lang="en-US" smtClean="0"/>
-              <a:t>6/4/2017</a:t>
+              <a:t>6/5/2017</a:t>
             </a:fld>
             <a:endParaRPr lang="en-US"/>
           </a:p>
@@ -11889,7 +11890,7 @@
           <a:p>
             <a:fld id="{FE8BC13A-84C2-4F23-B046-9F1FD285F1D3}" type="datetimeFigureOut">
               <a:rPr lang="en-US" smtClean="0"/>
-              <a:t>6/4/2017</a:t>
+              <a:t>6/5/2017</a:t>
             </a:fld>
             <a:endParaRPr lang="en-US"/>
           </a:p>
@@ -11984,7 +11985,7 @@
           <a:p>
             <a:fld id="{FE8BC13A-84C2-4F23-B046-9F1FD285F1D3}" type="datetimeFigureOut">
               <a:rPr lang="en-US" smtClean="0"/>
-              <a:t>6/4/2017</a:t>
+              <a:t>6/5/2017</a:t>
             </a:fld>
             <a:endParaRPr lang="en-US"/>
           </a:p>
@@ -12274,7 +12275,7 @@
           <a:p>
             <a:fld id="{FE8BC13A-84C2-4F23-B046-9F1FD285F1D3}" type="datetimeFigureOut">
               <a:rPr lang="en-US" smtClean="0"/>
-              <a:t>6/4/2017</a:t>
+              <a:t>6/5/2017</a:t>
             </a:fld>
             <a:endParaRPr lang="en-US"/>
           </a:p>
@@ -12551,7 +12552,7 @@
           <a:p>
             <a:fld id="{FE8BC13A-84C2-4F23-B046-9F1FD285F1D3}" type="datetimeFigureOut">
               <a:rPr lang="en-US" smtClean="0"/>
-              <a:t>6/4/2017</a:t>
+              <a:t>6/5/2017</a:t>
             </a:fld>
             <a:endParaRPr lang="en-US"/>
           </a:p>
@@ -12804,7 +12805,7 @@
           <a:p>
             <a:fld id="{FE8BC13A-84C2-4F23-B046-9F1FD285F1D3}" type="datetimeFigureOut">
               <a:rPr lang="en-US" smtClean="0"/>
-              <a:t>6/4/2017</a:t>
+              <a:t>6/5/2017</a:t>
             </a:fld>
             <a:endParaRPr lang="en-US"/>
           </a:p>
@@ -13789,15 +13790,7 @@
           <a:p>
             <a:r>
               <a:rPr lang="en-US" dirty="0" smtClean="0"/>
-              <a:t>Full </a:t>
-            </a:r>
-            <a:r>
-              <a:rPr lang="en-US" dirty="0" smtClean="0"/>
-              <a:t>CQRS and Event </a:t>
-            </a:r>
-            <a:r>
-              <a:rPr lang="en-US" dirty="0" smtClean="0"/>
-              <a:t>Sourcing plugin for the Akka.net actors </a:t>
+              <a:t>Full CQRS and Event Sourcing plugin for the Akka.net actors </a:t>
             </a:r>
           </a:p>
           <a:p>
@@ -14072,6 +14065,363 @@
 </p:sld>
 </file>
 
+<file path=ppt/slides/slide15.xml><?xml version="1.0" encoding="utf-8"?>
+<p:sld xmlns:a="http://schemas.openxmlformats.org/drawingml/2006/main" xmlns:r="http://schemas.openxmlformats.org/officeDocument/2006/relationships" xmlns:p="http://schemas.openxmlformats.org/presentationml/2006/main">
+  <p:cSld>
+    <p:spTree>
+      <p:nvGrpSpPr>
+        <p:cNvPr id="1" name=""/>
+        <p:cNvGrpSpPr/>
+        <p:nvPr/>
+      </p:nvGrpSpPr>
+      <p:grpSpPr>
+        <a:xfrm>
+          <a:off x="0" y="0"/>
+          <a:ext cx="0" cy="0"/>
+          <a:chOff x="0" y="0"/>
+          <a:chExt cx="0" cy="0"/>
+        </a:xfrm>
+      </p:grpSpPr>
+      <p:sp>
+        <p:nvSpPr>
+          <p:cNvPr id="5" name="Title 4"/>
+          <p:cNvSpPr>
+            <a:spLocks noGrp="1"/>
+          </p:cNvSpPr>
+          <p:nvPr>
+            <p:ph type="title"/>
+          </p:nvPr>
+        </p:nvSpPr>
+        <p:spPr/>
+        <p:txBody>
+          <a:bodyPr/>
+          <a:lstStyle/>
+          <a:p>
+            <a:r>
+              <a:rPr lang="en-US" dirty="0" smtClean="0"/>
+              <a:t>Thanks to all the new jaxdug members!</a:t>
+            </a:r>
+            <a:endParaRPr lang="en-US" dirty="0"/>
+          </a:p>
+        </p:txBody>
+      </p:sp>
+      <p:sp>
+        <p:nvSpPr>
+          <p:cNvPr id="7" name="Content Placeholder 6"/>
+          <p:cNvSpPr>
+            <a:spLocks noGrp="1"/>
+          </p:cNvSpPr>
+          <p:nvPr>
+            <p:ph sz="half" idx="2"/>
+          </p:nvPr>
+        </p:nvSpPr>
+        <p:spPr/>
+        <p:txBody>
+          <a:bodyPr>
+            <a:normAutofit/>
+          </a:bodyPr>
+          <a:lstStyle/>
+          <a:p>
+            <a:r>
+              <a:rPr lang="en-US" dirty="0" smtClean="0"/>
+              <a:t>Sample code and slides available online via my GitHub repository:</a:t>
+            </a:r>
+          </a:p>
+          <a:p>
+            <a:r>
+              <a:rPr lang="en-US" sz="1800" dirty="0">
+                <a:hlinkClick r:id="rId2"/>
+              </a:rPr>
+              <a:t>https://</a:t>
+            </a:r>
+            <a:r>
+              <a:rPr lang="en-US" sz="1800" dirty="0" smtClean="0">
+                <a:hlinkClick r:id="rId2"/>
+              </a:rPr>
+              <a:t>github.com/MarkEwer/JaxDugSamples</a:t>
+            </a:r>
+            <a:r>
+              <a:rPr lang="en-US" sz="1800" dirty="0" smtClean="0"/>
+              <a:t> </a:t>
+            </a:r>
+          </a:p>
+          <a:p>
+            <a:pPr algn="ctr"/>
+            <a:r>
+              <a:rPr lang="en-US" dirty="0" smtClean="0"/>
+              <a:t>______________________________</a:t>
+            </a:r>
+          </a:p>
+          <a:p>
+            <a:endParaRPr lang="en-US" dirty="0"/>
+          </a:p>
+          <a:p>
+            <a:r>
+              <a:rPr lang="en-US" sz="1300" dirty="0"/>
+              <a:t>Work:  </a:t>
+            </a:r>
+            <a:r>
+              <a:rPr lang="en-US" sz="1300" dirty="0" smtClean="0">
+                <a:hlinkClick r:id="rId3"/>
+              </a:rPr>
+              <a:t>Mewer@DiscoverTec.com</a:t>
+            </a:r>
+            <a:r>
+              <a:rPr lang="en-US" sz="1300" dirty="0" smtClean="0"/>
+              <a:t/>
+            </a:r>
+            <a:br>
+              <a:rPr lang="en-US" sz="1300" dirty="0" smtClean="0"/>
+            </a:br>
+            <a:r>
+              <a:rPr lang="en-US" sz="1300" dirty="0" smtClean="0"/>
+              <a:t>Personal</a:t>
+            </a:r>
+            <a:r>
+              <a:rPr lang="en-US" sz="1300" dirty="0"/>
+              <a:t>: </a:t>
+            </a:r>
+            <a:r>
+              <a:rPr lang="en-US" sz="1300" dirty="0" smtClean="0">
+                <a:hlinkClick r:id="rId4"/>
+              </a:rPr>
+              <a:t>Mark@3w3r.com</a:t>
+            </a:r>
+            <a:r>
+              <a:rPr lang="en-US" sz="1300" dirty="0" smtClean="0"/>
+              <a:t/>
+            </a:r>
+            <a:br>
+              <a:rPr lang="en-US" sz="1300" dirty="0" smtClean="0"/>
+            </a:br>
+            <a:r>
+              <a:rPr lang="en-US" sz="1300" dirty="0" smtClean="0"/>
+              <a:t>Web</a:t>
+            </a:r>
+            <a:r>
+              <a:rPr lang="en-US" sz="1300" dirty="0"/>
+              <a:t>: </a:t>
+            </a:r>
+            <a:r>
+              <a:rPr lang="en-US" sz="1300" dirty="0">
+                <a:hlinkClick r:id="rId5"/>
+              </a:rPr>
+              <a:t>http://</a:t>
+            </a:r>
+            <a:r>
+              <a:rPr lang="en-US" sz="1300" dirty="0" smtClean="0">
+                <a:hlinkClick r:id="rId5"/>
+              </a:rPr>
+              <a:t>www.markewer.com</a:t>
+            </a:r>
+            <a:r>
+              <a:rPr lang="en-US" sz="1300" dirty="0" smtClean="0"/>
+              <a:t/>
+            </a:r>
+            <a:br>
+              <a:rPr lang="en-US" sz="1300" dirty="0" smtClean="0"/>
+            </a:br>
+            <a:r>
+              <a:rPr lang="en-US" sz="1300" dirty="0" smtClean="0"/>
+              <a:t>LinkedIn</a:t>
+            </a:r>
+            <a:r>
+              <a:rPr lang="en-US" sz="1300" dirty="0"/>
+              <a:t>: </a:t>
+            </a:r>
+            <a:r>
+              <a:rPr lang="en-US" sz="1300" dirty="0">
+                <a:hlinkClick r:id="rId6"/>
+              </a:rPr>
+              <a:t>http://www.linkein.com/in/markewer</a:t>
+            </a:r>
+            <a:r>
+              <a:rPr lang="en-US" sz="1300" dirty="0"/>
+              <a:t> </a:t>
+            </a:r>
+            <a:r>
+              <a:rPr lang="en-US" sz="1300" dirty="0" smtClean="0"/>
+              <a:t/>
+            </a:r>
+            <a:br>
+              <a:rPr lang="en-US" sz="1300" dirty="0" smtClean="0"/>
+            </a:br>
+            <a:r>
+              <a:rPr lang="en-US" sz="1300" dirty="0" smtClean="0"/>
+              <a:t>Phone</a:t>
+            </a:r>
+            <a:r>
+              <a:rPr lang="en-US" sz="1300" dirty="0"/>
+              <a:t>: (904) 238-7347</a:t>
+            </a:r>
+          </a:p>
+          <a:p>
+            <a:endParaRPr lang="en-US" dirty="0"/>
+          </a:p>
+        </p:txBody>
+      </p:sp>
+      <p:pic>
+        <p:nvPicPr>
+          <p:cNvPr id="9" name="Picture 8"/>
+          <p:cNvPicPr>
+            <a:picLocks noChangeAspect="1"/>
+          </p:cNvPicPr>
+          <p:nvPr/>
+        </p:nvPicPr>
+        <p:blipFill rotWithShape="1">
+          <a:blip r:embed="rId7">
+            <a:extLst>
+              <a:ext uri="{28A0092B-C50C-407E-A947-70E740481C1C}">
+                <a14:useLocalDpi xmlns:a14="http://schemas.microsoft.com/office/drawing/2010/main" val="0"/>
+              </a:ext>
+            </a:extLst>
+          </a:blip>
+          <a:srcRect l="39527" r="23674"/>
+          <a:stretch/>
+        </p:blipFill>
+        <p:spPr>
+          <a:xfrm>
+            <a:off x="2075175" y="2813774"/>
+            <a:ext cx="2459878" cy="1051046"/>
+          </a:xfrm>
+          <a:prstGeom prst="rect">
+            <a:avLst/>
+          </a:prstGeom>
+        </p:spPr>
+      </p:pic>
+      <p:pic>
+        <p:nvPicPr>
+          <p:cNvPr id="8" name="Content Placeholder 7"/>
+          <p:cNvPicPr>
+            <a:picLocks noGrp="1" noChangeAspect="1"/>
+          </p:cNvPicPr>
+          <p:nvPr>
+            <p:ph sz="half" idx="1"/>
+          </p:nvPr>
+        </p:nvPicPr>
+        <p:blipFill>
+          <a:blip r:embed="rId8">
+            <a:extLst>
+              <a:ext uri="{28A0092B-C50C-407E-A947-70E740481C1C}">
+                <a14:useLocalDpi xmlns:a14="http://schemas.microsoft.com/office/drawing/2010/main" val="0"/>
+              </a:ext>
+            </a:extLst>
+          </a:blip>
+          <a:stretch>
+            <a:fillRect/>
+          </a:stretch>
+        </p:blipFill>
+        <p:spPr>
+          <a:xfrm>
+            <a:off x="1024128" y="2813773"/>
+            <a:ext cx="1051046" cy="1051046"/>
+          </a:xfrm>
+        </p:spPr>
+      </p:pic>
+      <p:pic>
+        <p:nvPicPr>
+          <p:cNvPr id="10" name="Picture 9"/>
+          <p:cNvPicPr>
+            <a:picLocks noChangeAspect="1"/>
+          </p:cNvPicPr>
+          <p:nvPr/>
+        </p:nvPicPr>
+        <p:blipFill>
+          <a:blip r:embed="rId9">
+            <a:extLst>
+              <a:ext uri="{28A0092B-C50C-407E-A947-70E740481C1C}">
+                <a14:useLocalDpi xmlns:a14="http://schemas.microsoft.com/office/drawing/2010/main" val="0"/>
+              </a:ext>
+            </a:extLst>
+          </a:blip>
+          <a:stretch>
+            <a:fillRect/>
+          </a:stretch>
+        </p:blipFill>
+        <p:spPr>
+          <a:xfrm>
+            <a:off x="1024128" y="4593761"/>
+            <a:ext cx="2190750" cy="857250"/>
+          </a:xfrm>
+          <a:prstGeom prst="rect">
+            <a:avLst/>
+          </a:prstGeom>
+        </p:spPr>
+      </p:pic>
+      <p:sp>
+        <p:nvSpPr>
+          <p:cNvPr id="11" name="TextBox 10"/>
+          <p:cNvSpPr txBox="1"/>
+          <p:nvPr/>
+        </p:nvSpPr>
+        <p:spPr>
+          <a:xfrm>
+            <a:off x="3263154" y="4593761"/>
+            <a:ext cx="2268402" cy="923330"/>
+          </a:xfrm>
+          <a:prstGeom prst="rect">
+            <a:avLst/>
+          </a:prstGeom>
+          <a:noFill/>
+        </p:spPr>
+        <p:txBody>
+          <a:bodyPr wrap="square" rtlCol="0">
+            <a:spAutoFit/>
+          </a:bodyPr>
+          <a:lstStyle/>
+          <a:p>
+            <a:r>
+              <a:rPr lang="en-US" dirty="0" smtClean="0"/>
+              <a:t>And, thanks to the sponsor for this event, Community First</a:t>
+            </a:r>
+            <a:endParaRPr lang="en-US" dirty="0"/>
+          </a:p>
+        </p:txBody>
+      </p:sp>
+      <p:sp>
+        <p:nvSpPr>
+          <p:cNvPr id="12" name="TextBox 11"/>
+          <p:cNvSpPr txBox="1"/>
+          <p:nvPr/>
+        </p:nvSpPr>
+        <p:spPr>
+          <a:xfrm>
+            <a:off x="1024128" y="3859957"/>
+            <a:ext cx="1051046" cy="307777"/>
+          </a:xfrm>
+          <a:prstGeom prst="rect">
+            <a:avLst/>
+          </a:prstGeom>
+          <a:noFill/>
+        </p:spPr>
+        <p:txBody>
+          <a:bodyPr wrap="square" rtlCol="0">
+            <a:spAutoFit/>
+          </a:bodyPr>
+          <a:lstStyle/>
+          <a:p>
+            <a:pPr algn="ctr"/>
+            <a:r>
+              <a:rPr lang="en-US" sz="1400" b="1" dirty="0" smtClean="0"/>
+              <a:t>Mark Ewer</a:t>
+            </a:r>
+            <a:endParaRPr lang="en-US" sz="1400" b="1" dirty="0"/>
+          </a:p>
+        </p:txBody>
+      </p:sp>
+    </p:spTree>
+    <p:extLst>
+      <p:ext uri="{BB962C8B-B14F-4D97-AF65-F5344CB8AC3E}">
+        <p14:creationId xmlns:p14="http://schemas.microsoft.com/office/powerpoint/2010/main" val="2468617388"/>
+      </p:ext>
+    </p:extLst>
+  </p:cSld>
+  <p:clrMapOvr>
+    <a:masterClrMapping/>
+  </p:clrMapOvr>
+</p:sld>
+</file>
+
 <file path=ppt/slides/slide2.xml><?xml version="1.0" encoding="utf-8"?>
 <p:sld xmlns:a="http://schemas.openxmlformats.org/drawingml/2006/main" xmlns:r="http://schemas.openxmlformats.org/officeDocument/2006/relationships" xmlns:p="http://schemas.openxmlformats.org/presentationml/2006/main">
   <p:cSld>
@@ -14330,18 +14680,9 @@
           </a:p>
           <a:p>
             <a:r>
-              <a:rPr lang="en-US" smtClean="0"/>
-              <a:t>Phone: </a:t>
-            </a:r>
-            <a:r>
               <a:rPr lang="en-US" dirty="0" smtClean="0"/>
-              <a:t>(904</a:t>
-            </a:r>
-            <a:r>
-              <a:rPr lang="en-US" smtClean="0"/>
-              <a:t>) 238-7347</a:t>
-            </a:r>
-            <a:endParaRPr lang="en-US" dirty="0" smtClean="0"/>
+              <a:t>Phone: (904) 238-7347</a:t>
+            </a:r>
           </a:p>
         </p:txBody>
       </p:sp>

</xml_diff>